<commit_message>
Fixing code error in TIMER usage
</commit_message>
<xml_diff>
--- a/presentations/PIC18-Main course.pptx
+++ b/presentations/PIC18-Main course.pptx
@@ -295,7 +295,7 @@
             <a:fld id="{F757A19A-7258-4DC0-A761-3EE74D5D30ED}" type="datetimeFigureOut">
               <a:rPr lang="en-US" smtClean="0"/>
               <a:pPr/>
-              <a:t>12/30/2016</a:t>
+              <a:t>4/2/2017</a:t>
             </a:fld>
             <a:endParaRPr lang="en-US"/>
           </a:p>
@@ -464,7 +464,7 @@
     </p:spTree>
     <p:extLst>
       <p:ext uri="{BB962C8B-B14F-4D97-AF65-F5344CB8AC3E}">
-        <p14:creationId xmlns="" xmlns:p14="http://schemas.microsoft.com/office/powerpoint/2010/main" val="3274577391"/>
+        <p14:creationId xmlns:p14="http://schemas.microsoft.com/office/powerpoint/2010/main" xmlns="" val="3274577391"/>
       </p:ext>
     </p:extLst>
   </p:cSld>
@@ -687,6 +687,88 @@
         </p:nvSpPr>
         <p:spPr/>
         <p:txBody>
+          <a:bodyPr>
+            <a:normAutofit/>
+          </a:bodyPr>
+          <a:lstStyle/>
+          <a:p>
+            <a:endParaRPr lang="en-IN" dirty="0"/>
+          </a:p>
+        </p:txBody>
+      </p:sp>
+      <p:sp>
+        <p:nvSpPr>
+          <p:cNvPr id="4" name="Slide Number Placeholder 3"/>
+          <p:cNvSpPr>
+            <a:spLocks noGrp="1"/>
+          </p:cNvSpPr>
+          <p:nvPr>
+            <p:ph type="sldNum" sz="quarter" idx="10"/>
+          </p:nvPr>
+        </p:nvSpPr>
+        <p:spPr/>
+        <p:txBody>
+          <a:bodyPr/>
+          <a:lstStyle/>
+          <a:p>
+            <a:fld id="{D3D7C2AA-A748-4E10-8F5B-9617F96D3163}" type="slidenum">
+              <a:rPr lang="en-US" smtClean="0"/>
+              <a:pPr/>
+              <a:t>56</a:t>
+            </a:fld>
+            <a:endParaRPr lang="en-US"/>
+          </a:p>
+        </p:txBody>
+      </p:sp>
+    </p:spTree>
+  </p:cSld>
+  <p:clrMapOvr>
+    <a:masterClrMapping/>
+  </p:clrMapOvr>
+</p:notes>
+</file>
+
+<file path=ppt/notesSlides/notesSlide3.xml><?xml version="1.0" encoding="utf-8"?>
+<p:notes xmlns:a="http://schemas.openxmlformats.org/drawingml/2006/main" xmlns:r="http://schemas.openxmlformats.org/officeDocument/2006/relationships" xmlns:p="http://schemas.openxmlformats.org/presentationml/2006/main">
+  <p:cSld>
+    <p:spTree>
+      <p:nvGrpSpPr>
+        <p:cNvPr id="1" name=""/>
+        <p:cNvGrpSpPr/>
+        <p:nvPr/>
+      </p:nvGrpSpPr>
+      <p:grpSpPr>
+        <a:xfrm>
+          <a:off x="0" y="0"/>
+          <a:ext cx="0" cy="0"/>
+          <a:chOff x="0" y="0"/>
+          <a:chExt cx="0" cy="0"/>
+        </a:xfrm>
+      </p:grpSpPr>
+      <p:sp>
+        <p:nvSpPr>
+          <p:cNvPr id="2" name="Slide Image Placeholder 1"/>
+          <p:cNvSpPr>
+            <a:spLocks noGrp="1" noRot="1" noChangeAspect="1"/>
+          </p:cNvSpPr>
+          <p:nvPr>
+            <p:ph type="sldImg"/>
+          </p:nvPr>
+        </p:nvSpPr>
+        <p:spPr/>
+      </p:sp>
+      <p:sp>
+        <p:nvSpPr>
+          <p:cNvPr id="3" name="Notes Placeholder 2"/>
+          <p:cNvSpPr>
+            <a:spLocks noGrp="1"/>
+          </p:cNvSpPr>
+          <p:nvPr>
+            <p:ph type="body" idx="1"/>
+          </p:nvPr>
+        </p:nvSpPr>
+        <p:spPr/>
+        <p:txBody>
           <a:bodyPr/>
           <a:lstStyle/>
           <a:p>
@@ -721,7 +803,7 @@
     </p:spTree>
     <p:extLst>
       <p:ext uri="{BB962C8B-B14F-4D97-AF65-F5344CB8AC3E}">
-        <p14:creationId xmlns="" xmlns:p14="http://schemas.microsoft.com/office/powerpoint/2010/main" val="4225478551"/>
+        <p14:creationId xmlns:p14="http://schemas.microsoft.com/office/powerpoint/2010/main" xmlns="" val="4225478551"/>
       </p:ext>
     </p:extLst>
   </p:cSld>
@@ -913,7 +995,7 @@
             <a:fld id="{582A603F-9039-411B-BC24-E2A6CDEE1B7E}" type="datetimeFigureOut">
               <a:rPr lang="en-IN" smtClean="0"/>
               <a:pPr/>
-              <a:t>30-12-2016</a:t>
+              <a:t>02-04-2017</a:t>
             </a:fld>
             <a:endParaRPr lang="en-IN"/>
           </a:p>
@@ -965,7 +1047,7 @@
     </p:spTree>
     <p:extLst>
       <p:ext uri="{BB962C8B-B14F-4D97-AF65-F5344CB8AC3E}">
-        <p14:creationId xmlns="" xmlns:p14="http://schemas.microsoft.com/office/powerpoint/2010/main" val="1688711623"/>
+        <p14:creationId xmlns:p14="http://schemas.microsoft.com/office/powerpoint/2010/main" xmlns="" val="1688711623"/>
       </p:ext>
     </p:extLst>
   </p:cSld>
@@ -1085,7 +1167,7 @@
             <a:fld id="{582A603F-9039-411B-BC24-E2A6CDEE1B7E}" type="datetimeFigureOut">
               <a:rPr lang="en-IN" smtClean="0"/>
               <a:pPr/>
-              <a:t>30-12-2016</a:t>
+              <a:t>02-04-2017</a:t>
             </a:fld>
             <a:endParaRPr lang="en-IN"/>
           </a:p>
@@ -1137,7 +1219,7 @@
     </p:spTree>
     <p:extLst>
       <p:ext uri="{BB962C8B-B14F-4D97-AF65-F5344CB8AC3E}">
-        <p14:creationId xmlns="" xmlns:p14="http://schemas.microsoft.com/office/powerpoint/2010/main" val="4158152790"/>
+        <p14:creationId xmlns:p14="http://schemas.microsoft.com/office/powerpoint/2010/main" xmlns="" val="4158152790"/>
       </p:ext>
     </p:extLst>
   </p:cSld>
@@ -1267,7 +1349,7 @@
             <a:fld id="{582A603F-9039-411B-BC24-E2A6CDEE1B7E}" type="datetimeFigureOut">
               <a:rPr lang="en-IN" smtClean="0"/>
               <a:pPr/>
-              <a:t>30-12-2016</a:t>
+              <a:t>02-04-2017</a:t>
             </a:fld>
             <a:endParaRPr lang="en-IN"/>
           </a:p>
@@ -1319,7 +1401,7 @@
     </p:spTree>
     <p:extLst>
       <p:ext uri="{BB962C8B-B14F-4D97-AF65-F5344CB8AC3E}">
-        <p14:creationId xmlns="" xmlns:p14="http://schemas.microsoft.com/office/powerpoint/2010/main" val="4226255741"/>
+        <p14:creationId xmlns:p14="http://schemas.microsoft.com/office/powerpoint/2010/main" xmlns="" val="4226255741"/>
       </p:ext>
     </p:extLst>
   </p:cSld>
@@ -1439,7 +1521,7 @@
             <a:fld id="{582A603F-9039-411B-BC24-E2A6CDEE1B7E}" type="datetimeFigureOut">
               <a:rPr lang="en-IN" smtClean="0"/>
               <a:pPr/>
-              <a:t>30-12-2016</a:t>
+              <a:t>02-04-2017</a:t>
             </a:fld>
             <a:endParaRPr lang="en-IN"/>
           </a:p>
@@ -1491,7 +1573,7 @@
     </p:spTree>
     <p:extLst>
       <p:ext uri="{BB962C8B-B14F-4D97-AF65-F5344CB8AC3E}">
-        <p14:creationId xmlns="" xmlns:p14="http://schemas.microsoft.com/office/powerpoint/2010/main" val="3065337001"/>
+        <p14:creationId xmlns:p14="http://schemas.microsoft.com/office/powerpoint/2010/main" xmlns="" val="3065337001"/>
       </p:ext>
     </p:extLst>
   </p:cSld>
@@ -1687,7 +1769,7 @@
             <a:fld id="{582A603F-9039-411B-BC24-E2A6CDEE1B7E}" type="datetimeFigureOut">
               <a:rPr lang="en-IN" smtClean="0"/>
               <a:pPr/>
-              <a:t>30-12-2016</a:t>
+              <a:t>02-04-2017</a:t>
             </a:fld>
             <a:endParaRPr lang="en-IN"/>
           </a:p>
@@ -1739,7 +1821,7 @@
     </p:spTree>
     <p:extLst>
       <p:ext uri="{BB962C8B-B14F-4D97-AF65-F5344CB8AC3E}">
-        <p14:creationId xmlns="" xmlns:p14="http://schemas.microsoft.com/office/powerpoint/2010/main" val="1879791560"/>
+        <p14:creationId xmlns:p14="http://schemas.microsoft.com/office/powerpoint/2010/main" xmlns="" val="1879791560"/>
       </p:ext>
     </p:extLst>
   </p:cSld>
@@ -1977,7 +2059,7 @@
             <a:fld id="{582A603F-9039-411B-BC24-E2A6CDEE1B7E}" type="datetimeFigureOut">
               <a:rPr lang="en-IN" smtClean="0"/>
               <a:pPr/>
-              <a:t>30-12-2016</a:t>
+              <a:t>02-04-2017</a:t>
             </a:fld>
             <a:endParaRPr lang="en-IN"/>
           </a:p>
@@ -2029,7 +2111,7 @@
     </p:spTree>
     <p:extLst>
       <p:ext uri="{BB962C8B-B14F-4D97-AF65-F5344CB8AC3E}">
-        <p14:creationId xmlns="" xmlns:p14="http://schemas.microsoft.com/office/powerpoint/2010/main" val="3946062831"/>
+        <p14:creationId xmlns:p14="http://schemas.microsoft.com/office/powerpoint/2010/main" xmlns="" val="3946062831"/>
       </p:ext>
     </p:extLst>
   </p:cSld>
@@ -2401,7 +2483,7 @@
             <a:fld id="{582A603F-9039-411B-BC24-E2A6CDEE1B7E}" type="datetimeFigureOut">
               <a:rPr lang="en-IN" smtClean="0"/>
               <a:pPr/>
-              <a:t>30-12-2016</a:t>
+              <a:t>02-04-2017</a:t>
             </a:fld>
             <a:endParaRPr lang="en-IN"/>
           </a:p>
@@ -2453,7 +2535,7 @@
     </p:spTree>
     <p:extLst>
       <p:ext uri="{BB962C8B-B14F-4D97-AF65-F5344CB8AC3E}">
-        <p14:creationId xmlns="" xmlns:p14="http://schemas.microsoft.com/office/powerpoint/2010/main" val="3280265667"/>
+        <p14:creationId xmlns:p14="http://schemas.microsoft.com/office/powerpoint/2010/main" xmlns="" val="3280265667"/>
       </p:ext>
     </p:extLst>
   </p:cSld>
@@ -2521,7 +2603,7 @@
             <a:fld id="{582A603F-9039-411B-BC24-E2A6CDEE1B7E}" type="datetimeFigureOut">
               <a:rPr lang="en-IN" smtClean="0"/>
               <a:pPr/>
-              <a:t>30-12-2016</a:t>
+              <a:t>02-04-2017</a:t>
             </a:fld>
             <a:endParaRPr lang="en-IN"/>
           </a:p>
@@ -2573,7 +2655,7 @@
     </p:spTree>
     <p:extLst>
       <p:ext uri="{BB962C8B-B14F-4D97-AF65-F5344CB8AC3E}">
-        <p14:creationId xmlns="" xmlns:p14="http://schemas.microsoft.com/office/powerpoint/2010/main" val="2071952885"/>
+        <p14:creationId xmlns:p14="http://schemas.microsoft.com/office/powerpoint/2010/main" xmlns="" val="2071952885"/>
       </p:ext>
     </p:extLst>
   </p:cSld>
@@ -2618,7 +2700,7 @@
             <a:fld id="{582A603F-9039-411B-BC24-E2A6CDEE1B7E}" type="datetimeFigureOut">
               <a:rPr lang="en-IN" smtClean="0"/>
               <a:pPr/>
-              <a:t>30-12-2016</a:t>
+              <a:t>02-04-2017</a:t>
             </a:fld>
             <a:endParaRPr lang="en-IN"/>
           </a:p>
@@ -2670,7 +2752,7 @@
     </p:spTree>
     <p:extLst>
       <p:ext uri="{BB962C8B-B14F-4D97-AF65-F5344CB8AC3E}">
-        <p14:creationId xmlns="" xmlns:p14="http://schemas.microsoft.com/office/powerpoint/2010/main" val="389020100"/>
+        <p14:creationId xmlns:p14="http://schemas.microsoft.com/office/powerpoint/2010/main" xmlns="" val="389020100"/>
       </p:ext>
     </p:extLst>
   </p:cSld>
@@ -2897,7 +2979,7 @@
             <a:fld id="{582A603F-9039-411B-BC24-E2A6CDEE1B7E}" type="datetimeFigureOut">
               <a:rPr lang="en-IN" smtClean="0"/>
               <a:pPr/>
-              <a:t>30-12-2016</a:t>
+              <a:t>02-04-2017</a:t>
             </a:fld>
             <a:endParaRPr lang="en-IN"/>
           </a:p>
@@ -2949,7 +3031,7 @@
     </p:spTree>
     <p:extLst>
       <p:ext uri="{BB962C8B-B14F-4D97-AF65-F5344CB8AC3E}">
-        <p14:creationId xmlns="" xmlns:p14="http://schemas.microsoft.com/office/powerpoint/2010/main" val="3331903280"/>
+        <p14:creationId xmlns:p14="http://schemas.microsoft.com/office/powerpoint/2010/main" xmlns="" val="3331903280"/>
       </p:ext>
     </p:extLst>
   </p:cSld>
@@ -3152,7 +3234,7 @@
             <a:fld id="{582A603F-9039-411B-BC24-E2A6CDEE1B7E}" type="datetimeFigureOut">
               <a:rPr lang="en-IN" smtClean="0"/>
               <a:pPr/>
-              <a:t>30-12-2016</a:t>
+              <a:t>02-04-2017</a:t>
             </a:fld>
             <a:endParaRPr lang="en-IN"/>
           </a:p>
@@ -3204,7 +3286,7 @@
     </p:spTree>
     <p:extLst>
       <p:ext uri="{BB962C8B-B14F-4D97-AF65-F5344CB8AC3E}">
-        <p14:creationId xmlns="" xmlns:p14="http://schemas.microsoft.com/office/powerpoint/2010/main" val="3057828531"/>
+        <p14:creationId xmlns:p14="http://schemas.microsoft.com/office/powerpoint/2010/main" xmlns="" val="3057828531"/>
       </p:ext>
     </p:extLst>
   </p:cSld>
@@ -3367,7 +3449,7 @@
             <a:fld id="{582A603F-9039-411B-BC24-E2A6CDEE1B7E}" type="datetimeFigureOut">
               <a:rPr lang="en-IN" smtClean="0"/>
               <a:pPr/>
-              <a:t>30-12-2016</a:t>
+              <a:t>02-04-2017</a:t>
             </a:fld>
             <a:endParaRPr lang="en-IN"/>
           </a:p>
@@ -3455,7 +3537,7 @@
     </p:spTree>
     <p:extLst>
       <p:ext uri="{BB962C8B-B14F-4D97-AF65-F5344CB8AC3E}">
-        <p14:creationId xmlns="" xmlns:p14="http://schemas.microsoft.com/office/powerpoint/2010/main" val="1437861790"/>
+        <p14:creationId xmlns:p14="http://schemas.microsoft.com/office/powerpoint/2010/main" xmlns="" val="1437861790"/>
       </p:ext>
     </p:extLst>
   </p:cSld>
@@ -3835,7 +3917,7 @@
     </p:spTree>
     <p:extLst>
       <p:ext uri="{BB962C8B-B14F-4D97-AF65-F5344CB8AC3E}">
-        <p14:creationId xmlns="" xmlns:p14="http://schemas.microsoft.com/office/powerpoint/2010/main" val="3706624300"/>
+        <p14:creationId xmlns:p14="http://schemas.microsoft.com/office/powerpoint/2010/main" xmlns="" val="3706624300"/>
       </p:ext>
     </p:extLst>
   </p:cSld>
@@ -3906,7 +3988,7 @@
           <a:blip r:embed="rId2">
             <a:extLst>
               <a:ext uri="{28A0092B-C50C-407E-A947-70E740481C1C}">
-                <a14:useLocalDpi xmlns="" xmlns:a14="http://schemas.microsoft.com/office/drawing/2010/main" val="0"/>
+                <a14:useLocalDpi xmlns:a14="http://schemas.microsoft.com/office/drawing/2010/main" xmlns="" val="0"/>
               </a:ext>
             </a:extLst>
           </a:blip>
@@ -3955,7 +4037,7 @@
     </p:spTree>
     <p:extLst>
       <p:ext uri="{BB962C8B-B14F-4D97-AF65-F5344CB8AC3E}">
-        <p14:creationId xmlns="" xmlns:p14="http://schemas.microsoft.com/office/powerpoint/2010/main" val="1056269233"/>
+        <p14:creationId xmlns:p14="http://schemas.microsoft.com/office/powerpoint/2010/main" xmlns="" val="1056269233"/>
       </p:ext>
     </p:extLst>
   </p:cSld>
@@ -4087,7 +4169,7 @@
           <a:blip r:embed="rId2">
             <a:extLst>
               <a:ext uri="{28A0092B-C50C-407E-A947-70E740481C1C}">
-                <a14:useLocalDpi xmlns="" xmlns:a14="http://schemas.microsoft.com/office/drawing/2010/main" val="0"/>
+                <a14:useLocalDpi xmlns:a14="http://schemas.microsoft.com/office/drawing/2010/main" xmlns="" val="0"/>
               </a:ext>
             </a:extLst>
           </a:blip>
@@ -4108,7 +4190,7 @@
     </p:spTree>
     <p:extLst>
       <p:ext uri="{BB962C8B-B14F-4D97-AF65-F5344CB8AC3E}">
-        <p14:creationId xmlns="" xmlns:p14="http://schemas.microsoft.com/office/powerpoint/2010/main" val="1060428498"/>
+        <p14:creationId xmlns:p14="http://schemas.microsoft.com/office/powerpoint/2010/main" xmlns="" val="1060428498"/>
       </p:ext>
     </p:extLst>
   </p:cSld>
@@ -4179,7 +4261,7 @@
           <a:blip r:embed="rId2">
             <a:extLst>
               <a:ext uri="{28A0092B-C50C-407E-A947-70E740481C1C}">
-                <a14:useLocalDpi xmlns="" xmlns:a14="http://schemas.microsoft.com/office/drawing/2010/main" val="0"/>
+                <a14:useLocalDpi xmlns:a14="http://schemas.microsoft.com/office/drawing/2010/main" xmlns="" val="0"/>
               </a:ext>
             </a:extLst>
           </a:blip>
@@ -4208,7 +4290,7 @@
           <a:blip r:embed="rId3">
             <a:extLst>
               <a:ext uri="{28A0092B-C50C-407E-A947-70E740481C1C}">
-                <a14:useLocalDpi xmlns="" xmlns:a14="http://schemas.microsoft.com/office/drawing/2010/main" val="0"/>
+                <a14:useLocalDpi xmlns:a14="http://schemas.microsoft.com/office/drawing/2010/main" xmlns="" val="0"/>
               </a:ext>
             </a:extLst>
           </a:blip>
@@ -4226,7 +4308,7 @@
     </p:spTree>
     <p:extLst>
       <p:ext uri="{BB962C8B-B14F-4D97-AF65-F5344CB8AC3E}">
-        <p14:creationId xmlns="" xmlns:p14="http://schemas.microsoft.com/office/powerpoint/2010/main" val="1965510453"/>
+        <p14:creationId xmlns:p14="http://schemas.microsoft.com/office/powerpoint/2010/main" xmlns="" val="1965510453"/>
       </p:ext>
     </p:extLst>
   </p:cSld>
@@ -4344,7 +4426,7 @@
           <p:nvPr>
             <p:extLst>
               <p:ext uri="{D42A27DB-BD31-4B8C-83A1-F6EECF244321}">
-                <p14:modId xmlns="" xmlns:p14="http://schemas.microsoft.com/office/powerpoint/2010/main" val="918929677"/>
+                <p14:modId xmlns:p14="http://schemas.microsoft.com/office/powerpoint/2010/main" xmlns="" val="918929677"/>
               </p:ext>
             </p:extLst>
           </p:nvPr>
@@ -4626,7 +4708,7 @@
     </p:spTree>
     <p:extLst>
       <p:ext uri="{BB962C8B-B14F-4D97-AF65-F5344CB8AC3E}">
-        <p14:creationId xmlns="" xmlns:p14="http://schemas.microsoft.com/office/powerpoint/2010/main" val="1213958740"/>
+        <p14:creationId xmlns:p14="http://schemas.microsoft.com/office/powerpoint/2010/main" xmlns="" val="1213958740"/>
       </p:ext>
     </p:extLst>
   </p:cSld>
@@ -4795,7 +4877,7 @@
           <a:blip r:embed="rId2">
             <a:extLst>
               <a:ext uri="{28A0092B-C50C-407E-A947-70E740481C1C}">
-                <a14:useLocalDpi xmlns="" xmlns:a14="http://schemas.microsoft.com/office/drawing/2010/main" val="0"/>
+                <a14:useLocalDpi xmlns:a14="http://schemas.microsoft.com/office/drawing/2010/main" xmlns="" val="0"/>
               </a:ext>
             </a:extLst>
           </a:blip>
@@ -4825,7 +4907,7 @@
           <a:blip r:embed="rId3">
             <a:extLst>
               <a:ext uri="{28A0092B-C50C-407E-A947-70E740481C1C}">
-                <a14:useLocalDpi xmlns="" xmlns:a14="http://schemas.microsoft.com/office/drawing/2010/main" val="0"/>
+                <a14:useLocalDpi xmlns:a14="http://schemas.microsoft.com/office/drawing/2010/main" xmlns="" val="0"/>
               </a:ext>
             </a:extLst>
           </a:blip>
@@ -4846,7 +4928,7 @@
     </p:spTree>
     <p:extLst>
       <p:ext uri="{BB962C8B-B14F-4D97-AF65-F5344CB8AC3E}">
-        <p14:creationId xmlns="" xmlns:p14="http://schemas.microsoft.com/office/powerpoint/2010/main" val="3772393506"/>
+        <p14:creationId xmlns:p14="http://schemas.microsoft.com/office/powerpoint/2010/main" xmlns="" val="3772393506"/>
       </p:ext>
     </p:extLst>
   </p:cSld>
@@ -4917,7 +4999,7 @@
           <a:blip r:embed="rId2">
             <a:extLst>
               <a:ext uri="{28A0092B-C50C-407E-A947-70E740481C1C}">
-                <a14:useLocalDpi xmlns="" xmlns:a14="http://schemas.microsoft.com/office/drawing/2010/main" val="0"/>
+                <a14:useLocalDpi xmlns:a14="http://schemas.microsoft.com/office/drawing/2010/main" xmlns="" val="0"/>
               </a:ext>
             </a:extLst>
           </a:blip>
@@ -4966,7 +5048,7 @@
     </p:spTree>
     <p:extLst>
       <p:ext uri="{BB962C8B-B14F-4D97-AF65-F5344CB8AC3E}">
-        <p14:creationId xmlns="" xmlns:p14="http://schemas.microsoft.com/office/powerpoint/2010/main" val="3415180783"/>
+        <p14:creationId xmlns:p14="http://schemas.microsoft.com/office/powerpoint/2010/main" xmlns="" val="3415180783"/>
       </p:ext>
     </p:extLst>
   </p:cSld>
@@ -5044,7 +5126,7 @@
           <a:blip r:embed="rId2">
             <a:extLst>
               <a:ext uri="{28A0092B-C50C-407E-A947-70E740481C1C}">
-                <a14:useLocalDpi xmlns="" xmlns:a14="http://schemas.microsoft.com/office/drawing/2010/main" val="0"/>
+                <a14:useLocalDpi xmlns:a14="http://schemas.microsoft.com/office/drawing/2010/main" xmlns="" val="0"/>
               </a:ext>
             </a:extLst>
           </a:blip>
@@ -5112,14 +5194,14 @@
           </a:ln>
           <a:extLst>
             <a:ext uri="{909E8E84-426E-40DD-AFC4-6F175D3DCCD1}">
-              <a14:hiddenFill xmlns="" xmlns:a14="http://schemas.microsoft.com/office/drawing/2010/main">
+              <a14:hiddenFill xmlns:a14="http://schemas.microsoft.com/office/drawing/2010/main" xmlns="">
                 <a:solidFill>
                   <a:srgbClr val="FFFFFF"/>
                 </a:solidFill>
               </a14:hiddenFill>
             </a:ext>
             <a:ext uri="{91240B29-F687-4F45-9708-019B960494DF}">
-              <a14:hiddenLine xmlns="" xmlns:a14="http://schemas.microsoft.com/office/drawing/2010/main" w="9525">
+              <a14:hiddenLine xmlns:a14="http://schemas.microsoft.com/office/drawing/2010/main" xmlns="" w="9525">
                 <a:solidFill>
                   <a:srgbClr val="000000"/>
                 </a:solidFill>
@@ -5255,7 +5337,7 @@
     </p:spTree>
     <p:extLst>
       <p:ext uri="{BB962C8B-B14F-4D97-AF65-F5344CB8AC3E}">
-        <p14:creationId xmlns="" xmlns:p14="http://schemas.microsoft.com/office/powerpoint/2010/main" val="2891116573"/>
+        <p14:creationId xmlns:p14="http://schemas.microsoft.com/office/powerpoint/2010/main" xmlns="" val="2891116573"/>
       </p:ext>
     </p:extLst>
   </p:cSld>
@@ -5440,7 +5522,7 @@
     </p:spTree>
     <p:extLst>
       <p:ext uri="{BB962C8B-B14F-4D97-AF65-F5344CB8AC3E}">
-        <p14:creationId xmlns="" xmlns:p14="http://schemas.microsoft.com/office/powerpoint/2010/main" val="1802525764"/>
+        <p14:creationId xmlns:p14="http://schemas.microsoft.com/office/powerpoint/2010/main" xmlns="" val="1802525764"/>
       </p:ext>
     </p:extLst>
   </p:cSld>
@@ -6068,14 +6150,14 @@
           </a:ln>
           <a:extLst>
             <a:ext uri="{909E8E84-426E-40DD-AFC4-6F175D3DCCD1}">
-              <a14:hiddenFill xmlns="" xmlns:a14="http://schemas.microsoft.com/office/drawing/2010/main">
+              <a14:hiddenFill xmlns:a14="http://schemas.microsoft.com/office/drawing/2010/main" xmlns="">
                 <a:solidFill>
                   <a:srgbClr val="FFFFFF"/>
                 </a:solidFill>
               </a14:hiddenFill>
             </a:ext>
             <a:ext uri="{91240B29-F687-4F45-9708-019B960494DF}">
-              <a14:hiddenLine xmlns="" xmlns:a14="http://schemas.microsoft.com/office/drawing/2010/main" w="9525">
+              <a14:hiddenLine xmlns:a14="http://schemas.microsoft.com/office/drawing/2010/main" xmlns="" w="9525">
                 <a:solidFill>
                   <a:srgbClr val="000000"/>
                 </a:solidFill>
@@ -6235,7 +6317,7 @@
     </p:spTree>
     <p:extLst>
       <p:ext uri="{BB962C8B-B14F-4D97-AF65-F5344CB8AC3E}">
-        <p14:creationId xmlns="" xmlns:p14="http://schemas.microsoft.com/office/powerpoint/2010/main" val="66754838"/>
+        <p14:creationId xmlns:p14="http://schemas.microsoft.com/office/powerpoint/2010/main" xmlns="" val="66754838"/>
       </p:ext>
     </p:extLst>
   </p:cSld>
@@ -6306,7 +6388,7 @@
           <a:blip r:embed="rId2">
             <a:extLst>
               <a:ext uri="{28A0092B-C50C-407E-A947-70E740481C1C}">
-                <a14:useLocalDpi xmlns="" xmlns:a14="http://schemas.microsoft.com/office/drawing/2010/main" val="0"/>
+                <a14:useLocalDpi xmlns:a14="http://schemas.microsoft.com/office/drawing/2010/main" xmlns="" val="0"/>
               </a:ext>
             </a:extLst>
           </a:blip>
@@ -6324,7 +6406,7 @@
     </p:spTree>
     <p:extLst>
       <p:ext uri="{BB962C8B-B14F-4D97-AF65-F5344CB8AC3E}">
-        <p14:creationId xmlns="" xmlns:p14="http://schemas.microsoft.com/office/powerpoint/2010/main" val="1929388869"/>
+        <p14:creationId xmlns:p14="http://schemas.microsoft.com/office/powerpoint/2010/main" xmlns="" val="1929388869"/>
       </p:ext>
     </p:extLst>
   </p:cSld>
@@ -6513,7 +6595,7 @@
     </p:spTree>
     <p:extLst>
       <p:ext uri="{BB962C8B-B14F-4D97-AF65-F5344CB8AC3E}">
-        <p14:creationId xmlns="" xmlns:p14="http://schemas.microsoft.com/office/powerpoint/2010/main" val="2357899085"/>
+        <p14:creationId xmlns:p14="http://schemas.microsoft.com/office/powerpoint/2010/main" xmlns="" val="2357899085"/>
       </p:ext>
     </p:extLst>
   </p:cSld>
@@ -6642,7 +6724,7 @@
     </p:spTree>
     <p:extLst>
       <p:ext uri="{BB962C8B-B14F-4D97-AF65-F5344CB8AC3E}">
-        <p14:creationId xmlns="" xmlns:p14="http://schemas.microsoft.com/office/powerpoint/2010/main" val="1823837439"/>
+        <p14:creationId xmlns:p14="http://schemas.microsoft.com/office/powerpoint/2010/main" xmlns="" val="1823837439"/>
       </p:ext>
     </p:extLst>
   </p:cSld>
@@ -6842,7 +6924,7 @@
     </p:spTree>
     <p:extLst>
       <p:ext uri="{BB962C8B-B14F-4D97-AF65-F5344CB8AC3E}">
-        <p14:creationId xmlns="" xmlns:p14="http://schemas.microsoft.com/office/powerpoint/2010/main" val="2857543163"/>
+        <p14:creationId xmlns:p14="http://schemas.microsoft.com/office/powerpoint/2010/main" xmlns="" val="2857543163"/>
       </p:ext>
     </p:extLst>
   </p:cSld>
@@ -7089,7 +7171,7 @@
     </p:spTree>
     <p:extLst>
       <p:ext uri="{BB962C8B-B14F-4D97-AF65-F5344CB8AC3E}">
-        <p14:creationId xmlns="" xmlns:p14="http://schemas.microsoft.com/office/powerpoint/2010/main" val="3406292418"/>
+        <p14:creationId xmlns:p14="http://schemas.microsoft.com/office/powerpoint/2010/main" xmlns="" val="3406292418"/>
       </p:ext>
     </p:extLst>
   </p:cSld>
@@ -7207,7 +7289,7 @@
           <a:blip r:embed="rId2">
             <a:extLst>
               <a:ext uri="{28A0092B-C50C-407E-A947-70E740481C1C}">
-                <a14:useLocalDpi xmlns="" xmlns:a14="http://schemas.microsoft.com/office/drawing/2010/main" val="0"/>
+                <a14:useLocalDpi xmlns:a14="http://schemas.microsoft.com/office/drawing/2010/main" xmlns="" val="0"/>
               </a:ext>
             </a:extLst>
           </a:blip>
@@ -7230,14 +7312,14 @@
           </a:ln>
           <a:extLst>
             <a:ext uri="{909E8E84-426E-40DD-AFC4-6F175D3DCCD1}">
-              <a14:hiddenFill xmlns="" xmlns:a14="http://schemas.microsoft.com/office/drawing/2010/main">
+              <a14:hiddenFill xmlns:a14="http://schemas.microsoft.com/office/drawing/2010/main" xmlns="">
                 <a:solidFill>
                   <a:srgbClr val="FFFFFF"/>
                 </a:solidFill>
               </a14:hiddenFill>
             </a:ext>
             <a:ext uri="{91240B29-F687-4F45-9708-019B960494DF}">
-              <a14:hiddenLine xmlns="" xmlns:a14="http://schemas.microsoft.com/office/drawing/2010/main" w="9525">
+              <a14:hiddenLine xmlns:a14="http://schemas.microsoft.com/office/drawing/2010/main" xmlns="" w="9525">
                 <a:solidFill>
                   <a:srgbClr val="000000"/>
                 </a:solidFill>
@@ -7252,7 +7334,7 @@
     </p:spTree>
     <p:extLst>
       <p:ext uri="{BB962C8B-B14F-4D97-AF65-F5344CB8AC3E}">
-        <p14:creationId xmlns="" xmlns:p14="http://schemas.microsoft.com/office/powerpoint/2010/main" val="1143734213"/>
+        <p14:creationId xmlns:p14="http://schemas.microsoft.com/office/powerpoint/2010/main" xmlns="" val="1143734213"/>
       </p:ext>
     </p:extLst>
   </p:cSld>
@@ -7600,7 +7682,7 @@
     </p:spTree>
     <p:extLst>
       <p:ext uri="{BB962C8B-B14F-4D97-AF65-F5344CB8AC3E}">
-        <p14:creationId xmlns="" xmlns:p14="http://schemas.microsoft.com/office/powerpoint/2010/main" val="4294030161"/>
+        <p14:creationId xmlns:p14="http://schemas.microsoft.com/office/powerpoint/2010/main" xmlns="" val="4294030161"/>
       </p:ext>
     </p:extLst>
   </p:cSld>
@@ -7895,7 +7977,7 @@
     </p:spTree>
     <p:extLst>
       <p:ext uri="{BB962C8B-B14F-4D97-AF65-F5344CB8AC3E}">
-        <p14:creationId xmlns="" xmlns:p14="http://schemas.microsoft.com/office/powerpoint/2010/main" val="2514206331"/>
+        <p14:creationId xmlns:p14="http://schemas.microsoft.com/office/powerpoint/2010/main" xmlns="" val="2514206331"/>
       </p:ext>
     </p:extLst>
   </p:cSld>
@@ -7994,7 +8076,7 @@
     </p:spTree>
     <p:extLst>
       <p:ext uri="{BB962C8B-B14F-4D97-AF65-F5344CB8AC3E}">
-        <p14:creationId xmlns="" xmlns:p14="http://schemas.microsoft.com/office/powerpoint/2010/main" val="657756463"/>
+        <p14:creationId xmlns:p14="http://schemas.microsoft.com/office/powerpoint/2010/main" xmlns="" val="657756463"/>
       </p:ext>
     </p:extLst>
   </p:cSld>
@@ -8105,7 +8187,7 @@
     </p:spTree>
     <p:extLst>
       <p:ext uri="{BB962C8B-B14F-4D97-AF65-F5344CB8AC3E}">
-        <p14:creationId xmlns="" xmlns:p14="http://schemas.microsoft.com/office/powerpoint/2010/main" val="2778759772"/>
+        <p14:creationId xmlns:p14="http://schemas.microsoft.com/office/powerpoint/2010/main" xmlns="" val="2778759772"/>
       </p:ext>
     </p:extLst>
   </p:cSld>
@@ -8259,7 +8341,7 @@
     </p:spTree>
     <p:extLst>
       <p:ext uri="{BB962C8B-B14F-4D97-AF65-F5344CB8AC3E}">
-        <p14:creationId xmlns="" xmlns:p14="http://schemas.microsoft.com/office/powerpoint/2010/main" val="811742148"/>
+        <p14:creationId xmlns:p14="http://schemas.microsoft.com/office/powerpoint/2010/main" xmlns="" val="811742148"/>
       </p:ext>
     </p:extLst>
   </p:cSld>
@@ -8310,15 +8392,7 @@
           <a:p>
             <a:r>
               <a:rPr lang="en-US" dirty="0" smtClean="0"/>
-              <a:t>Looping </a:t>
-            </a:r>
-            <a:r>
-              <a:rPr lang="en-US" dirty="0" smtClean="0"/>
-              <a:t>(2/3</a:t>
-            </a:r>
-            <a:r>
-              <a:rPr lang="en-US" dirty="0" smtClean="0"/>
-              <a:t>)</a:t>
+              <a:t>Looping (2/3)</a:t>
             </a:r>
             <a:endParaRPr lang="en-US" dirty="0"/>
           </a:p>
@@ -8354,13 +8428,8 @@
             <a:pPr lvl="1"/>
             <a:r>
               <a:rPr lang="en-US" dirty="0" smtClean="0"/>
-              <a:t>Using </a:t>
-            </a:r>
-            <a:r>
-              <a:rPr lang="en-US" dirty="0" smtClean="0"/>
-              <a:t>loop and conditional branching (BNZ)</a:t>
-            </a:r>
-            <a:endParaRPr lang="en-US" dirty="0" smtClean="0"/>
+              <a:t>Using loop and conditional branching (BNZ)</a:t>
+            </a:r>
           </a:p>
           <a:p>
             <a:pPr marL="457200" lvl="1" indent="0">
@@ -8481,7 +8550,7 @@
     </p:spTree>
     <p:extLst>
       <p:ext uri="{BB962C8B-B14F-4D97-AF65-F5344CB8AC3E}">
-        <p14:creationId xmlns="" xmlns:p14="http://schemas.microsoft.com/office/powerpoint/2010/main" val="1872660964"/>
+        <p14:creationId xmlns:p14="http://schemas.microsoft.com/office/powerpoint/2010/main" xmlns="" val="1872660964"/>
       </p:ext>
     </p:extLst>
   </p:cSld>
@@ -8532,15 +8601,7 @@
           <a:p>
             <a:r>
               <a:rPr lang="en-US" dirty="0" smtClean="0"/>
-              <a:t>Looping </a:t>
-            </a:r>
-            <a:r>
-              <a:rPr lang="en-US" dirty="0" smtClean="0"/>
-              <a:t>(3/3</a:t>
-            </a:r>
-            <a:r>
-              <a:rPr lang="en-US" dirty="0" smtClean="0"/>
-              <a:t>)</a:t>
+              <a:t>Looping (3/3)</a:t>
             </a:r>
             <a:endParaRPr lang="en-US" dirty="0"/>
           </a:p>
@@ -8576,11 +8637,7 @@
             <a:pPr lvl="1"/>
             <a:r>
               <a:rPr lang="en-US" dirty="0" smtClean="0"/>
-              <a:t>Using a </a:t>
-            </a:r>
-            <a:r>
-              <a:rPr lang="en-US" dirty="0" smtClean="0"/>
-              <a:t>loop and </a:t>
+              <a:t>Using a loop and </a:t>
             </a:r>
             <a:r>
               <a:rPr lang="en-US" b="1" dirty="0" err="1" smtClean="0"/>
@@ -8590,7 +8647,6 @@
               <a:rPr lang="en-US" dirty="0" smtClean="0"/>
               <a:t> branching</a:t>
             </a:r>
-            <a:endParaRPr lang="en-US" dirty="0" smtClean="0"/>
           </a:p>
           <a:p>
             <a:pPr marL="457200" lvl="1" indent="0">
@@ -8719,7 +8775,7 @@
     </p:spTree>
     <p:extLst>
       <p:ext uri="{BB962C8B-B14F-4D97-AF65-F5344CB8AC3E}">
-        <p14:creationId xmlns="" xmlns:p14="http://schemas.microsoft.com/office/powerpoint/2010/main" val="2825352884"/>
+        <p14:creationId xmlns:p14="http://schemas.microsoft.com/office/powerpoint/2010/main" xmlns="" val="2825352884"/>
       </p:ext>
     </p:extLst>
   </p:cSld>
@@ -8849,7 +8905,7 @@
     </p:spTree>
     <p:extLst>
       <p:ext uri="{BB962C8B-B14F-4D97-AF65-F5344CB8AC3E}">
-        <p14:creationId xmlns="" xmlns:p14="http://schemas.microsoft.com/office/powerpoint/2010/main" val="1583923881"/>
+        <p14:creationId xmlns:p14="http://schemas.microsoft.com/office/powerpoint/2010/main" xmlns="" val="1583923881"/>
       </p:ext>
     </p:extLst>
   </p:cSld>
@@ -8938,7 +8994,7 @@
     </p:spTree>
     <p:extLst>
       <p:ext uri="{BB962C8B-B14F-4D97-AF65-F5344CB8AC3E}">
-        <p14:creationId xmlns="" xmlns:p14="http://schemas.microsoft.com/office/powerpoint/2010/main" val="2373433868"/>
+        <p14:creationId xmlns:p14="http://schemas.microsoft.com/office/powerpoint/2010/main" xmlns="" val="2373433868"/>
       </p:ext>
     </p:extLst>
   </p:cSld>
@@ -9074,15 +9130,7 @@
             </a:r>
             <a:r>
               <a:rPr lang="en-US" sz="2000" dirty="0" smtClean="0"/>
-              <a:t> </a:t>
-            </a:r>
-            <a:r>
-              <a:rPr lang="en-US" sz="2000" dirty="0" smtClean="0"/>
-              <a:t> </a:t>
-            </a:r>
-            <a:r>
-              <a:rPr lang="en-US" sz="2000" dirty="0" smtClean="0"/>
-              <a:t>HERE</a:t>
+              <a:t>  HERE</a:t>
             </a:r>
             <a:endParaRPr lang="en-US" sz="2000" dirty="0"/>
           </a:p>
@@ -9108,14 +9156,13 @@
               <a:rPr lang="en-US" sz="2000" dirty="0" smtClean="0"/>
               <a:t>$</a:t>
             </a:r>
-            <a:endParaRPr lang="en-US" sz="2000" dirty="0" smtClean="0"/>
           </a:p>
         </p:txBody>
       </p:sp>
     </p:spTree>
     <p:extLst>
       <p:ext uri="{BB962C8B-B14F-4D97-AF65-F5344CB8AC3E}">
-        <p14:creationId xmlns="" xmlns:p14="http://schemas.microsoft.com/office/powerpoint/2010/main" val="693377374"/>
+        <p14:creationId xmlns:p14="http://schemas.microsoft.com/office/powerpoint/2010/main" xmlns="" val="693377374"/>
       </p:ext>
     </p:extLst>
   </p:cSld>
@@ -9186,7 +9233,7 @@
           <a:blip r:embed="rId2">
             <a:extLst>
               <a:ext uri="{28A0092B-C50C-407E-A947-70E740481C1C}">
-                <a14:useLocalDpi xmlns="" xmlns:a14="http://schemas.microsoft.com/office/drawing/2010/main" val="0"/>
+                <a14:useLocalDpi xmlns:a14="http://schemas.microsoft.com/office/drawing/2010/main" xmlns="" val="0"/>
               </a:ext>
             </a:extLst>
           </a:blip>
@@ -9235,7 +9282,7 @@
     </p:spTree>
     <p:extLst>
       <p:ext uri="{BB962C8B-B14F-4D97-AF65-F5344CB8AC3E}">
-        <p14:creationId xmlns="" xmlns:p14="http://schemas.microsoft.com/office/powerpoint/2010/main" val="3640093536"/>
+        <p14:creationId xmlns:p14="http://schemas.microsoft.com/office/powerpoint/2010/main" xmlns="" val="3640093536"/>
       </p:ext>
     </p:extLst>
   </p:cSld>
@@ -9325,11 +9372,7 @@
             <a:pPr lvl="1"/>
             <a:r>
               <a:rPr lang="en-US" dirty="0" smtClean="0"/>
-              <a:t>The </a:t>
-            </a:r>
-            <a:r>
-              <a:rPr lang="en-US" dirty="0" smtClean="0"/>
-              <a:t>CPU saves the address (PC) of the “next” instruction on the “stack”</a:t>
+              <a:t>The CPU saves the address (PC) of the “next” instruction on the “stack”</a:t>
             </a:r>
           </a:p>
           <a:p>
@@ -9488,7 +9531,7 @@
     </p:spTree>
     <p:extLst>
       <p:ext uri="{BB962C8B-B14F-4D97-AF65-F5344CB8AC3E}">
-        <p14:creationId xmlns="" xmlns:p14="http://schemas.microsoft.com/office/powerpoint/2010/main" val="3971361830"/>
+        <p14:creationId xmlns:p14="http://schemas.microsoft.com/office/powerpoint/2010/main" xmlns="" val="3971361830"/>
       </p:ext>
     </p:extLst>
   </p:cSld>
@@ -9583,11 +9626,7 @@
           <a:p>
             <a:r>
               <a:rPr lang="en-US" dirty="0" smtClean="0"/>
-              <a:t>The </a:t>
-            </a:r>
-            <a:r>
-              <a:rPr lang="en-US" dirty="0" smtClean="0"/>
-              <a:t>stack is a LIFO</a:t>
+              <a:t>The stack is a LIFO</a:t>
             </a:r>
           </a:p>
           <a:p>
@@ -9617,7 +9656,7 @@
     </p:spTree>
     <p:extLst>
       <p:ext uri="{BB962C8B-B14F-4D97-AF65-F5344CB8AC3E}">
-        <p14:creationId xmlns="" xmlns:p14="http://schemas.microsoft.com/office/powerpoint/2010/main" val="2928965768"/>
+        <p14:creationId xmlns:p14="http://schemas.microsoft.com/office/powerpoint/2010/main" xmlns="" val="2928965768"/>
       </p:ext>
     </p:extLst>
   </p:cSld>
@@ -9881,7 +9920,7 @@
     </p:spTree>
     <p:extLst>
       <p:ext uri="{BB962C8B-B14F-4D97-AF65-F5344CB8AC3E}">
-        <p14:creationId xmlns="" xmlns:p14="http://schemas.microsoft.com/office/powerpoint/2010/main" val="563223670"/>
+        <p14:creationId xmlns:p14="http://schemas.microsoft.com/office/powerpoint/2010/main" xmlns="" val="563223670"/>
       </p:ext>
     </p:extLst>
   </p:cSld>
@@ -10052,7 +10091,7 @@
     </p:spTree>
     <p:extLst>
       <p:ext uri="{BB962C8B-B14F-4D97-AF65-F5344CB8AC3E}">
-        <p14:creationId xmlns="" xmlns:p14="http://schemas.microsoft.com/office/powerpoint/2010/main" val="1020632707"/>
+        <p14:creationId xmlns:p14="http://schemas.microsoft.com/office/powerpoint/2010/main" xmlns="" val="1020632707"/>
       </p:ext>
     </p:extLst>
   </p:cSld>
@@ -10215,7 +10254,7 @@
     </p:spTree>
     <p:extLst>
       <p:ext uri="{BB962C8B-B14F-4D97-AF65-F5344CB8AC3E}">
-        <p14:creationId xmlns="" xmlns:p14="http://schemas.microsoft.com/office/powerpoint/2010/main" val="2409991996"/>
+        <p14:creationId xmlns:p14="http://schemas.microsoft.com/office/powerpoint/2010/main" xmlns="" val="2409991996"/>
       </p:ext>
     </p:extLst>
   </p:cSld>
@@ -10388,7 +10427,7 @@
     </p:spTree>
     <p:extLst>
       <p:ext uri="{BB962C8B-B14F-4D97-AF65-F5344CB8AC3E}">
-        <p14:creationId xmlns="" xmlns:p14="http://schemas.microsoft.com/office/powerpoint/2010/main" val="1604867810"/>
+        <p14:creationId xmlns:p14="http://schemas.microsoft.com/office/powerpoint/2010/main" xmlns="" val="1604867810"/>
       </p:ext>
     </p:extLst>
   </p:cSld>
@@ -10502,7 +10541,7 @@
     </p:spTree>
     <p:extLst>
       <p:ext uri="{BB962C8B-B14F-4D97-AF65-F5344CB8AC3E}">
-        <p14:creationId xmlns="" xmlns:p14="http://schemas.microsoft.com/office/powerpoint/2010/main" val="1219594076"/>
+        <p14:creationId xmlns:p14="http://schemas.microsoft.com/office/powerpoint/2010/main" xmlns="" val="1219594076"/>
       </p:ext>
     </p:extLst>
   </p:cSld>
@@ -10632,7 +10671,7 @@
     </p:spTree>
     <p:extLst>
       <p:ext uri="{BB962C8B-B14F-4D97-AF65-F5344CB8AC3E}">
-        <p14:creationId xmlns="" xmlns:p14="http://schemas.microsoft.com/office/powerpoint/2010/main" val="1428971796"/>
+        <p14:creationId xmlns:p14="http://schemas.microsoft.com/office/powerpoint/2010/main" xmlns="" val="1428971796"/>
       </p:ext>
     </p:extLst>
   </p:cSld>
@@ -10820,7 +10859,7 @@
     </p:spTree>
     <p:extLst>
       <p:ext uri="{BB962C8B-B14F-4D97-AF65-F5344CB8AC3E}">
-        <p14:creationId xmlns="" xmlns:p14="http://schemas.microsoft.com/office/powerpoint/2010/main" val="1128821226"/>
+        <p14:creationId xmlns:p14="http://schemas.microsoft.com/office/powerpoint/2010/main" xmlns="" val="1128821226"/>
       </p:ext>
     </p:extLst>
   </p:cSld>
@@ -11028,7 +11067,7 @@
     </p:spTree>
     <p:extLst>
       <p:ext uri="{BB962C8B-B14F-4D97-AF65-F5344CB8AC3E}">
-        <p14:creationId xmlns="" xmlns:p14="http://schemas.microsoft.com/office/powerpoint/2010/main" val="175984831"/>
+        <p14:creationId xmlns:p14="http://schemas.microsoft.com/office/powerpoint/2010/main" xmlns="" val="175984831"/>
       </p:ext>
     </p:extLst>
   </p:cSld>
@@ -11114,7 +11153,7 @@
           <a:blip r:embed="rId2">
             <a:extLst>
               <a:ext uri="{28A0092B-C50C-407E-A947-70E740481C1C}">
-                <a14:useLocalDpi xmlns="" xmlns:a14="http://schemas.microsoft.com/office/drawing/2010/main" val="0"/>
+                <a14:useLocalDpi xmlns:a14="http://schemas.microsoft.com/office/drawing/2010/main" xmlns="" val="0"/>
               </a:ext>
             </a:extLst>
           </a:blip>
@@ -11163,7 +11202,7 @@
     </p:spTree>
     <p:extLst>
       <p:ext uri="{BB962C8B-B14F-4D97-AF65-F5344CB8AC3E}">
-        <p14:creationId xmlns="" xmlns:p14="http://schemas.microsoft.com/office/powerpoint/2010/main" val="386168732"/>
+        <p14:creationId xmlns:p14="http://schemas.microsoft.com/office/powerpoint/2010/main" xmlns="" val="386168732"/>
       </p:ext>
     </p:extLst>
   </p:cSld>
@@ -11351,7 +11390,7 @@
     </p:spTree>
     <p:extLst>
       <p:ext uri="{BB962C8B-B14F-4D97-AF65-F5344CB8AC3E}">
-        <p14:creationId xmlns="" xmlns:p14="http://schemas.microsoft.com/office/powerpoint/2010/main" val="725939246"/>
+        <p14:creationId xmlns:p14="http://schemas.microsoft.com/office/powerpoint/2010/main" xmlns="" val="725939246"/>
       </p:ext>
     </p:extLst>
   </p:cSld>
@@ -11594,7 +11633,7 @@
     </p:spTree>
     <p:extLst>
       <p:ext uri="{BB962C8B-B14F-4D97-AF65-F5344CB8AC3E}">
-        <p14:creationId xmlns="" xmlns:p14="http://schemas.microsoft.com/office/powerpoint/2010/main" val="350928868"/>
+        <p14:creationId xmlns:p14="http://schemas.microsoft.com/office/powerpoint/2010/main" xmlns="" val="350928868"/>
       </p:ext>
     </p:extLst>
   </p:cSld>
@@ -11676,11 +11715,7 @@
           <a:p>
             <a:r>
               <a:rPr lang="en-US" dirty="0" smtClean="0"/>
-              <a:t>The </a:t>
-            </a:r>
-            <a:r>
-              <a:rPr lang="en-US" dirty="0" smtClean="0"/>
-              <a:t>DB (define byte) directive is used to store decimal/hex/binary values and strings</a:t>
+              <a:t>The DB (define byte) directive is used to store decimal/hex/binary values and strings</a:t>
             </a:r>
           </a:p>
           <a:p>
@@ -11747,17 +11782,8 @@
           <a:p>
             <a:r>
               <a:rPr lang="en-US" dirty="0" smtClean="0"/>
-              <a:t>SFR’s to </a:t>
-            </a:r>
-            <a:r>
-              <a:rPr lang="en-US" dirty="0" smtClean="0"/>
-              <a:t>address ROM code </a:t>
-            </a:r>
-            <a:r>
-              <a:rPr lang="en-US" dirty="0" smtClean="0"/>
-              <a:t>space</a:t>
-            </a:r>
-            <a:endParaRPr lang="en-US" dirty="0" smtClean="0"/>
+              <a:t>SFR’s to address ROM code space</a:t>
+            </a:r>
           </a:p>
           <a:p>
             <a:pPr lvl="1"/>
@@ -11779,13 +11805,7 @@
               <a:rPr lang="en-US" dirty="0" smtClean="0">
                 <a:sym typeface="Wingdings" pitchFamily="2" charset="2"/>
               </a:rPr>
-              <a:t>TBLPTRL</a:t>
-            </a:r>
-            <a:r>
-              <a:rPr lang="en-US" dirty="0" smtClean="0">
-                <a:sym typeface="Wingdings" pitchFamily="2" charset="2"/>
-              </a:rPr>
-              <a:t>, TBLPTRH, TBLPTRU</a:t>
+              <a:t>TBLPTRL, TBLPTRH, TBLPTRU</a:t>
             </a:r>
           </a:p>
           <a:p>
@@ -11887,7 +11907,7 @@
     </p:spTree>
     <p:extLst>
       <p:ext uri="{BB962C8B-B14F-4D97-AF65-F5344CB8AC3E}">
-        <p14:creationId xmlns="" xmlns:p14="http://schemas.microsoft.com/office/powerpoint/2010/main" val="75858303"/>
+        <p14:creationId xmlns:p14="http://schemas.microsoft.com/office/powerpoint/2010/main" xmlns="" val="75858303"/>
       </p:ext>
     </p:extLst>
   </p:cSld>
@@ -12162,7 +12182,7 @@
     </p:spTree>
     <p:extLst>
       <p:ext uri="{BB962C8B-B14F-4D97-AF65-F5344CB8AC3E}">
-        <p14:creationId xmlns="" xmlns:p14="http://schemas.microsoft.com/office/powerpoint/2010/main" val="3921243077"/>
+        <p14:creationId xmlns:p14="http://schemas.microsoft.com/office/powerpoint/2010/main" xmlns="" val="3921243077"/>
       </p:ext>
     </p:extLst>
   </p:cSld>
@@ -12490,7 +12510,7 @@
     </p:spTree>
     <p:extLst>
       <p:ext uri="{BB962C8B-B14F-4D97-AF65-F5344CB8AC3E}">
-        <p14:creationId xmlns="" xmlns:p14="http://schemas.microsoft.com/office/powerpoint/2010/main" val="4237280264"/>
+        <p14:creationId xmlns:p14="http://schemas.microsoft.com/office/powerpoint/2010/main" xmlns="" val="4237280264"/>
       </p:ext>
     </p:extLst>
   </p:cSld>
@@ -12795,7 +12815,7 @@
     </p:spTree>
     <p:extLst>
       <p:ext uri="{BB962C8B-B14F-4D97-AF65-F5344CB8AC3E}">
-        <p14:creationId xmlns="" xmlns:p14="http://schemas.microsoft.com/office/powerpoint/2010/main" val="3290149242"/>
+        <p14:creationId xmlns:p14="http://schemas.microsoft.com/office/powerpoint/2010/main" xmlns="" val="3290149242"/>
       </p:ext>
     </p:extLst>
   </p:cSld>
@@ -12967,7 +12987,7 @@
     </p:spTree>
     <p:extLst>
       <p:ext uri="{BB962C8B-B14F-4D97-AF65-F5344CB8AC3E}">
-        <p14:creationId xmlns="" xmlns:p14="http://schemas.microsoft.com/office/powerpoint/2010/main" val="3804336673"/>
+        <p14:creationId xmlns:p14="http://schemas.microsoft.com/office/powerpoint/2010/main" xmlns="" val="3804336673"/>
       </p:ext>
     </p:extLst>
   </p:cSld>
@@ -13236,7 +13256,7 @@
     </p:spTree>
     <p:extLst>
       <p:ext uri="{BB962C8B-B14F-4D97-AF65-F5344CB8AC3E}">
-        <p14:creationId xmlns="" xmlns:p14="http://schemas.microsoft.com/office/powerpoint/2010/main" val="766186551"/>
+        <p14:creationId xmlns:p14="http://schemas.microsoft.com/office/powerpoint/2010/main" xmlns="" val="766186551"/>
       </p:ext>
     </p:extLst>
   </p:cSld>
@@ -13361,7 +13381,7 @@
     </p:spTree>
     <p:extLst>
       <p:ext uri="{BB962C8B-B14F-4D97-AF65-F5344CB8AC3E}">
-        <p14:creationId xmlns="" xmlns:p14="http://schemas.microsoft.com/office/powerpoint/2010/main" val="1805731737"/>
+        <p14:creationId xmlns:p14="http://schemas.microsoft.com/office/powerpoint/2010/main" xmlns="" val="1805731737"/>
       </p:ext>
     </p:extLst>
   </p:cSld>
@@ -13957,7 +13977,7 @@
     </p:spTree>
     <p:extLst>
       <p:ext uri="{BB962C8B-B14F-4D97-AF65-F5344CB8AC3E}">
-        <p14:creationId xmlns="" xmlns:p14="http://schemas.microsoft.com/office/powerpoint/2010/main" val="4287547112"/>
+        <p14:creationId xmlns:p14="http://schemas.microsoft.com/office/powerpoint/2010/main" xmlns="" val="4287547112"/>
       </p:ext>
     </p:extLst>
   </p:cSld>
@@ -14043,7 +14063,7 @@
           <a:blip r:embed="rId2">
             <a:extLst>
               <a:ext uri="{28A0092B-C50C-407E-A947-70E740481C1C}">
-                <a14:useLocalDpi xmlns="" xmlns:a14="http://schemas.microsoft.com/office/drawing/2010/main" val="0"/>
+                <a14:useLocalDpi xmlns:a14="http://schemas.microsoft.com/office/drawing/2010/main" xmlns="" val="0"/>
               </a:ext>
             </a:extLst>
           </a:blip>
@@ -14092,7 +14112,7 @@
     </p:spTree>
     <p:extLst>
       <p:ext uri="{BB962C8B-B14F-4D97-AF65-F5344CB8AC3E}">
-        <p14:creationId xmlns="" xmlns:p14="http://schemas.microsoft.com/office/powerpoint/2010/main" val="3090231891"/>
+        <p14:creationId xmlns:p14="http://schemas.microsoft.com/office/powerpoint/2010/main" xmlns="" val="3090231891"/>
       </p:ext>
     </p:extLst>
   </p:cSld>
@@ -14627,7 +14647,7 @@
     </p:spTree>
     <p:extLst>
       <p:ext uri="{BB962C8B-B14F-4D97-AF65-F5344CB8AC3E}">
-        <p14:creationId xmlns="" xmlns:p14="http://schemas.microsoft.com/office/powerpoint/2010/main" val="562196141"/>
+        <p14:creationId xmlns:p14="http://schemas.microsoft.com/office/powerpoint/2010/main" xmlns="" val="562196141"/>
       </p:ext>
     </p:extLst>
   </p:cSld>
@@ -15146,7 +15166,7 @@
     </p:spTree>
     <p:extLst>
       <p:ext uri="{BB962C8B-B14F-4D97-AF65-F5344CB8AC3E}">
-        <p14:creationId xmlns="" xmlns:p14="http://schemas.microsoft.com/office/powerpoint/2010/main" val="2230081601"/>
+        <p14:creationId xmlns:p14="http://schemas.microsoft.com/office/powerpoint/2010/main" xmlns="" val="2230081601"/>
       </p:ext>
     </p:extLst>
   </p:cSld>
@@ -15271,7 +15291,7 @@
     </p:spTree>
     <p:extLst>
       <p:ext uri="{BB962C8B-B14F-4D97-AF65-F5344CB8AC3E}">
-        <p14:creationId xmlns="" xmlns:p14="http://schemas.microsoft.com/office/powerpoint/2010/main" val="4099140610"/>
+        <p14:creationId xmlns:p14="http://schemas.microsoft.com/office/powerpoint/2010/main" xmlns="" val="4099140610"/>
       </p:ext>
     </p:extLst>
   </p:cSld>
@@ -15410,7 +15430,7 @@
     </p:spTree>
     <p:extLst>
       <p:ext uri="{BB962C8B-B14F-4D97-AF65-F5344CB8AC3E}">
-        <p14:creationId xmlns="" xmlns:p14="http://schemas.microsoft.com/office/powerpoint/2010/main" val="803643266"/>
+        <p14:creationId xmlns:p14="http://schemas.microsoft.com/office/powerpoint/2010/main" xmlns="" val="803643266"/>
       </p:ext>
     </p:extLst>
   </p:cSld>
@@ -15555,7 +15575,7 @@
     </p:spTree>
     <p:extLst>
       <p:ext uri="{BB962C8B-B14F-4D97-AF65-F5344CB8AC3E}">
-        <p14:creationId xmlns="" xmlns:p14="http://schemas.microsoft.com/office/powerpoint/2010/main" val="398661341"/>
+        <p14:creationId xmlns:p14="http://schemas.microsoft.com/office/powerpoint/2010/main" xmlns="" val="398661341"/>
       </p:ext>
     </p:extLst>
   </p:cSld>
@@ -15871,7 +15891,7 @@
     </p:spTree>
     <p:extLst>
       <p:ext uri="{BB962C8B-B14F-4D97-AF65-F5344CB8AC3E}">
-        <p14:creationId xmlns="" xmlns:p14="http://schemas.microsoft.com/office/powerpoint/2010/main" val="39581866"/>
+        <p14:creationId xmlns:p14="http://schemas.microsoft.com/office/powerpoint/2010/main" xmlns="" val="39581866"/>
       </p:ext>
     </p:extLst>
   </p:cSld>
@@ -16203,7 +16223,7 @@
     </p:spTree>
     <p:extLst>
       <p:ext uri="{BB962C8B-B14F-4D97-AF65-F5344CB8AC3E}">
-        <p14:creationId xmlns="" xmlns:p14="http://schemas.microsoft.com/office/powerpoint/2010/main" val="2586043452"/>
+        <p14:creationId xmlns:p14="http://schemas.microsoft.com/office/powerpoint/2010/main" xmlns="" val="2586043452"/>
       </p:ext>
     </p:extLst>
   </p:cSld>
@@ -16325,20 +16345,15 @@
             </a:r>
             <a:r>
               <a:rPr lang="en-US" dirty="0" smtClean="0"/>
-              <a:t> (TRISBbits.TRISB3</a:t>
-            </a:r>
-            <a:r>
-              <a:rPr lang="en-US" dirty="0" smtClean="0"/>
-              <a:t>)</a:t>
-            </a:r>
-            <a:endParaRPr lang="en-US" dirty="0" smtClean="0"/>
+              <a:t> (TRISBbits.TRISB3)</a:t>
+            </a:r>
           </a:p>
         </p:txBody>
       </p:sp>
     </p:spTree>
     <p:extLst>
       <p:ext uri="{BB962C8B-B14F-4D97-AF65-F5344CB8AC3E}">
-        <p14:creationId xmlns="" xmlns:p14="http://schemas.microsoft.com/office/powerpoint/2010/main" val="2216543143"/>
+        <p14:creationId xmlns:p14="http://schemas.microsoft.com/office/powerpoint/2010/main" xmlns="" val="2216543143"/>
       </p:ext>
     </p:extLst>
   </p:cSld>
@@ -16597,7 +16612,7 @@
     </p:spTree>
     <p:extLst>
       <p:ext uri="{BB962C8B-B14F-4D97-AF65-F5344CB8AC3E}">
-        <p14:creationId xmlns="" xmlns:p14="http://schemas.microsoft.com/office/powerpoint/2010/main" val="2688777488"/>
+        <p14:creationId xmlns:p14="http://schemas.microsoft.com/office/powerpoint/2010/main" xmlns="" val="2688777488"/>
       </p:ext>
     </p:extLst>
   </p:cSld>
@@ -16887,7 +16902,7 @@
     </p:spTree>
     <p:extLst>
       <p:ext uri="{BB962C8B-B14F-4D97-AF65-F5344CB8AC3E}">
-        <p14:creationId xmlns="" xmlns:p14="http://schemas.microsoft.com/office/powerpoint/2010/main" val="1917150916"/>
+        <p14:creationId xmlns:p14="http://schemas.microsoft.com/office/powerpoint/2010/main" xmlns="" val="1917150916"/>
       </p:ext>
     </p:extLst>
   </p:cSld>
@@ -17005,7 +17020,7 @@
           <a:blip r:embed="rId2">
             <a:extLst>
               <a:ext uri="{28A0092B-C50C-407E-A947-70E740481C1C}">
-                <a14:useLocalDpi xmlns="" xmlns:a14="http://schemas.microsoft.com/office/drawing/2010/main" val="0"/>
+                <a14:useLocalDpi xmlns:a14="http://schemas.microsoft.com/office/drawing/2010/main" xmlns="" val="0"/>
               </a:ext>
             </a:extLst>
           </a:blip>
@@ -17028,14 +17043,14 @@
           </a:ln>
           <a:extLst>
             <a:ext uri="{909E8E84-426E-40DD-AFC4-6F175D3DCCD1}">
-              <a14:hiddenFill xmlns="" xmlns:a14="http://schemas.microsoft.com/office/drawing/2010/main">
+              <a14:hiddenFill xmlns:a14="http://schemas.microsoft.com/office/drawing/2010/main" xmlns="">
                 <a:solidFill>
                   <a:srgbClr val="FFFFFF"/>
                 </a:solidFill>
               </a14:hiddenFill>
             </a:ext>
             <a:ext uri="{91240B29-F687-4F45-9708-019B960494DF}">
-              <a14:hiddenLine xmlns="" xmlns:a14="http://schemas.microsoft.com/office/drawing/2010/main" w="9525">
+              <a14:hiddenLine xmlns:a14="http://schemas.microsoft.com/office/drawing/2010/main" xmlns="" w="9525">
                 <a:solidFill>
                   <a:srgbClr val="000000"/>
                 </a:solidFill>
@@ -17050,7 +17065,7 @@
     </p:spTree>
     <p:extLst>
       <p:ext uri="{BB962C8B-B14F-4D97-AF65-F5344CB8AC3E}">
-        <p14:creationId xmlns="" xmlns:p14="http://schemas.microsoft.com/office/powerpoint/2010/main" val="3561209551"/>
+        <p14:creationId xmlns:p14="http://schemas.microsoft.com/office/powerpoint/2010/main" xmlns="" val="3561209551"/>
       </p:ext>
     </p:extLst>
   </p:cSld>
@@ -17226,7 +17241,7 @@
     </p:spTree>
     <p:extLst>
       <p:ext uri="{BB962C8B-B14F-4D97-AF65-F5344CB8AC3E}">
-        <p14:creationId xmlns="" xmlns:p14="http://schemas.microsoft.com/office/powerpoint/2010/main" val="3778867642"/>
+        <p14:creationId xmlns:p14="http://schemas.microsoft.com/office/powerpoint/2010/main" xmlns="" val="3778867642"/>
       </p:ext>
     </p:extLst>
   </p:cSld>
@@ -17331,11 +17346,7 @@
             <a:pPr lvl="1"/>
             <a:r>
               <a:rPr lang="en-US" dirty="0" smtClean="0"/>
-              <a:t>Placement </a:t>
-            </a:r>
-            <a:r>
-              <a:rPr lang="en-US" dirty="0" smtClean="0"/>
-              <a:t>can be made exact through </a:t>
+              <a:t>Placement can be made exact through </a:t>
             </a:r>
             <a:r>
               <a:rPr lang="en-US" b="1" dirty="0" smtClean="0"/>
@@ -17374,11 +17385,7 @@
             </a:r>
             <a:r>
               <a:rPr lang="en-US" dirty="0" smtClean="0"/>
-              <a:t> </a:t>
-            </a:r>
-            <a:r>
-              <a:rPr lang="en-US" dirty="0" smtClean="0"/>
-              <a:t>unsigned char </a:t>
+              <a:t> unsigned char </a:t>
             </a:r>
             <a:r>
               <a:rPr lang="en-US" dirty="0" err="1" smtClean="0"/>
@@ -17428,7 +17435,7 @@
     </p:spTree>
     <p:extLst>
       <p:ext uri="{BB962C8B-B14F-4D97-AF65-F5344CB8AC3E}">
-        <p14:creationId xmlns="" xmlns:p14="http://schemas.microsoft.com/office/powerpoint/2010/main" val="1541692436"/>
+        <p14:creationId xmlns:p14="http://schemas.microsoft.com/office/powerpoint/2010/main" xmlns="" val="1541692436"/>
       </p:ext>
     </p:extLst>
   </p:cSld>
@@ -17603,7 +17610,7 @@
     </p:spTree>
     <p:extLst>
       <p:ext uri="{BB962C8B-B14F-4D97-AF65-F5344CB8AC3E}">
-        <p14:creationId xmlns="" xmlns:p14="http://schemas.microsoft.com/office/powerpoint/2010/main" val="1022701262"/>
+        <p14:creationId xmlns:p14="http://schemas.microsoft.com/office/powerpoint/2010/main" xmlns="" val="1022701262"/>
       </p:ext>
     </p:extLst>
   </p:cSld>
@@ -17746,7 +17753,7 @@
     </p:spTree>
     <p:extLst>
       <p:ext uri="{BB962C8B-B14F-4D97-AF65-F5344CB8AC3E}">
-        <p14:creationId xmlns="" xmlns:p14="http://schemas.microsoft.com/office/powerpoint/2010/main" val="3325301034"/>
+        <p14:creationId xmlns:p14="http://schemas.microsoft.com/office/powerpoint/2010/main" xmlns="" val="3325301034"/>
       </p:ext>
     </p:extLst>
   </p:cSld>
@@ -18317,7 +18324,7 @@
     </p:spTree>
     <p:extLst>
       <p:ext uri="{BB962C8B-B14F-4D97-AF65-F5344CB8AC3E}">
-        <p14:creationId xmlns="" xmlns:p14="http://schemas.microsoft.com/office/powerpoint/2010/main" val="3460925073"/>
+        <p14:creationId xmlns:p14="http://schemas.microsoft.com/office/powerpoint/2010/main" xmlns="" val="3460925073"/>
       </p:ext>
     </p:extLst>
   </p:cSld>
@@ -18530,7 +18537,7 @@
     </p:spTree>
     <p:extLst>
       <p:ext uri="{BB962C8B-B14F-4D97-AF65-F5344CB8AC3E}">
-        <p14:creationId xmlns="" xmlns:p14="http://schemas.microsoft.com/office/powerpoint/2010/main" val="1275621605"/>
+        <p14:creationId xmlns:p14="http://schemas.microsoft.com/office/powerpoint/2010/main" xmlns="" val="1275621605"/>
       </p:ext>
     </p:extLst>
   </p:cSld>
@@ -18581,11 +18588,7 @@
           <a:p>
             <a:r>
               <a:rPr lang="en-US" dirty="0" smtClean="0"/>
-              <a:t>PIC18 Timer0 </a:t>
-            </a:r>
-            <a:r>
-              <a:rPr lang="en-US" dirty="0" smtClean="0"/>
-              <a:t>Usage</a:t>
+              <a:t>PIC18 Timer0 Usage</a:t>
             </a:r>
             <a:endParaRPr lang="en-US" dirty="0"/>
           </a:p>
@@ -18636,21 +18639,12 @@
               <a:rPr lang="en-US" dirty="0" smtClean="0"/>
               <a:t>Methods to use overflow:</a:t>
             </a:r>
-            <a:endParaRPr lang="en-US" dirty="0" smtClean="0"/>
           </a:p>
           <a:p>
             <a:pPr lvl="1"/>
             <a:r>
               <a:rPr lang="en-US" dirty="0" smtClean="0"/>
-              <a:t>Se</a:t>
-            </a:r>
-            <a:r>
-              <a:rPr lang="en-US" dirty="0" smtClean="0"/>
-              <a:t>t </a:t>
-            </a:r>
-            <a:r>
-              <a:rPr lang="en-US" dirty="0" smtClean="0"/>
-              <a:t>off TMR0 by setting TMR0ON bit to 1, and monitoring TMR0IF continuously in a loop</a:t>
+              <a:t>Set off TMR0 by setting TMR0ON bit to 1, and monitoring TMR0IF continuously in a loop</a:t>
             </a:r>
           </a:p>
           <a:p>
@@ -18666,7 +18660,7 @@
     </p:spTree>
     <p:extLst>
       <p:ext uri="{BB962C8B-B14F-4D97-AF65-F5344CB8AC3E}">
-        <p14:creationId xmlns="" xmlns:p14="http://schemas.microsoft.com/office/powerpoint/2010/main" val="2816810529"/>
+        <p14:creationId xmlns:p14="http://schemas.microsoft.com/office/powerpoint/2010/main" xmlns="" val="2816810529"/>
       </p:ext>
     </p:extLst>
   </p:cSld>
@@ -18742,11 +18736,7 @@
           <a:p>
             <a:r>
               <a:rPr lang="en-US" dirty="0" smtClean="0"/>
-              <a:t>General </a:t>
-            </a:r>
-            <a:r>
-              <a:rPr lang="en-US" dirty="0" smtClean="0"/>
-              <a:t>procedure</a:t>
+              <a:t>General procedure</a:t>
             </a:r>
           </a:p>
           <a:p>
@@ -18768,15 +18758,7 @@
             </a:r>
             <a:r>
               <a:rPr lang="en-US" dirty="0" smtClean="0"/>
-              <a:t> bits (keep </a:t>
-            </a:r>
-            <a:r>
-              <a:rPr lang="en-US" dirty="0" smtClean="0"/>
-              <a:t>TMR0ON at 0</a:t>
-            </a:r>
-            <a:r>
-              <a:rPr lang="en-US" dirty="0" smtClean="0"/>
-              <a:t>)</a:t>
+              <a:t> bits (keep TMR0ON at 0)</a:t>
             </a:r>
           </a:p>
           <a:p>
@@ -18797,13 +18779,8 @@
             <a:pPr lvl="2"/>
             <a:r>
               <a:rPr lang="en-US" dirty="0" smtClean="0"/>
-              <a:t>Call </a:t>
-            </a:r>
-            <a:r>
-              <a:rPr lang="en-US" dirty="0" smtClean="0"/>
-              <a:t>the function TMR_DELAY</a:t>
-            </a:r>
-            <a:endParaRPr lang="en-US" dirty="0" smtClean="0"/>
+              <a:t>Call the function TMR_DELAY</a:t>
+            </a:r>
           </a:p>
           <a:p>
             <a:pPr lvl="2"/>
@@ -18823,15 +18800,7 @@
             <a:pPr lvl="2"/>
             <a:r>
               <a:rPr lang="en-US" dirty="0" smtClean="0"/>
-              <a:t>Start timer </a:t>
-            </a:r>
-            <a:r>
-              <a:rPr lang="en-US" dirty="0" smtClean="0"/>
-              <a:t>(set TMR0ON </a:t>
-            </a:r>
-            <a:r>
-              <a:rPr lang="en-US" dirty="0" smtClean="0"/>
-              <a:t>to 1)</a:t>
+              <a:t>Start timer (set TMR0ON to 1)</a:t>
             </a:r>
           </a:p>
           <a:p>
@@ -18868,7 +18837,7 @@
     </p:spTree>
     <p:extLst>
       <p:ext uri="{BB962C8B-B14F-4D97-AF65-F5344CB8AC3E}">
-        <p14:creationId xmlns="" xmlns:p14="http://schemas.microsoft.com/office/powerpoint/2010/main" val="3385114002"/>
+        <p14:creationId xmlns:p14="http://schemas.microsoft.com/office/powerpoint/2010/main" xmlns="" val="3385114002"/>
       </p:ext>
     </p:extLst>
   </p:cSld>
@@ -19145,6 +19114,10 @@
               <a:buNone/>
             </a:pPr>
             <a:r>
+              <a:rPr lang="en-US" sz="5600" dirty="0" smtClean="0"/>
+              <a:t>LOOP</a:t>
+            </a:r>
+            <a:r>
               <a:rPr lang="en-US" sz="5600" dirty="0"/>
               <a:t>	</a:t>
             </a:r>
@@ -19163,8 +19136,13 @@
             </a:r>
             <a:r>
               <a:rPr lang="en-US" sz="5600" dirty="0" smtClean="0"/>
-              <a:t>BRA TMR_DLY</a:t>
-            </a:r>
+              <a:t>BRA </a:t>
+            </a:r>
+            <a:r>
+              <a:rPr lang="en-US" sz="5600" dirty="0" smtClean="0"/>
+              <a:t>LOOP</a:t>
+            </a:r>
+            <a:endParaRPr lang="en-US" sz="5600" dirty="0" smtClean="0"/>
           </a:p>
           <a:p>
             <a:pPr marL="0" indent="0">
@@ -19420,7 +19398,7 @@
     </p:spTree>
     <p:extLst>
       <p:ext uri="{BB962C8B-B14F-4D97-AF65-F5344CB8AC3E}">
-        <p14:creationId xmlns="" xmlns:p14="http://schemas.microsoft.com/office/powerpoint/2010/main" val="2462510171"/>
+        <p14:creationId xmlns:p14="http://schemas.microsoft.com/office/powerpoint/2010/main" xmlns="" val="2462510171"/>
       </p:ext>
     </p:extLst>
   </p:cSld>
@@ -19599,7 +19577,7 @@
     </p:spTree>
     <p:extLst>
       <p:ext uri="{BB962C8B-B14F-4D97-AF65-F5344CB8AC3E}">
-        <p14:creationId xmlns="" xmlns:p14="http://schemas.microsoft.com/office/powerpoint/2010/main" val="3522753562"/>
+        <p14:creationId xmlns:p14="http://schemas.microsoft.com/office/powerpoint/2010/main" xmlns="" val="3522753562"/>
       </p:ext>
     </p:extLst>
   </p:cSld>
@@ -19750,7 +19728,7 @@
     </p:spTree>
     <p:extLst>
       <p:ext uri="{BB962C8B-B14F-4D97-AF65-F5344CB8AC3E}">
-        <p14:creationId xmlns="" xmlns:p14="http://schemas.microsoft.com/office/powerpoint/2010/main" val="701030487"/>
+        <p14:creationId xmlns:p14="http://schemas.microsoft.com/office/powerpoint/2010/main" xmlns="" val="701030487"/>
       </p:ext>
     </p:extLst>
   </p:cSld>
@@ -19869,7 +19847,7 @@
     </p:spTree>
     <p:extLst>
       <p:ext uri="{BB962C8B-B14F-4D97-AF65-F5344CB8AC3E}">
-        <p14:creationId xmlns="" xmlns:p14="http://schemas.microsoft.com/office/powerpoint/2010/main" val="716205648"/>
+        <p14:creationId xmlns:p14="http://schemas.microsoft.com/office/powerpoint/2010/main" xmlns="" val="716205648"/>
       </p:ext>
     </p:extLst>
   </p:cSld>
@@ -20015,7 +19993,7 @@
     </p:spTree>
     <p:extLst>
       <p:ext uri="{BB962C8B-B14F-4D97-AF65-F5344CB8AC3E}">
-        <p14:creationId xmlns="" xmlns:p14="http://schemas.microsoft.com/office/powerpoint/2010/main" val="400433061"/>
+        <p14:creationId xmlns:p14="http://schemas.microsoft.com/office/powerpoint/2010/main" xmlns="" val="400433061"/>
       </p:ext>
     </p:extLst>
   </p:cSld>
@@ -20147,7 +20125,7 @@
           <p:nvPr>
             <p:extLst>
               <p:ext uri="{D42A27DB-BD31-4B8C-83A1-F6EECF244321}">
-                <p14:modId xmlns="" xmlns:p14="http://schemas.microsoft.com/office/powerpoint/2010/main" val="3363731547"/>
+                <p14:modId xmlns:p14="http://schemas.microsoft.com/office/powerpoint/2010/main" xmlns="" val="3363731547"/>
               </p:ext>
             </p:extLst>
           </p:nvPr>
@@ -20394,7 +20372,7 @@
     </p:spTree>
     <p:extLst>
       <p:ext uri="{BB962C8B-B14F-4D97-AF65-F5344CB8AC3E}">
-        <p14:creationId xmlns="" xmlns:p14="http://schemas.microsoft.com/office/powerpoint/2010/main" val="2758717937"/>
+        <p14:creationId xmlns:p14="http://schemas.microsoft.com/office/powerpoint/2010/main" xmlns="" val="2758717937"/>
       </p:ext>
     </p:extLst>
   </p:cSld>
@@ -20562,7 +20540,7 @@
     </p:spTree>
     <p:extLst>
       <p:ext uri="{BB962C8B-B14F-4D97-AF65-F5344CB8AC3E}">
-        <p14:creationId xmlns="" xmlns:p14="http://schemas.microsoft.com/office/powerpoint/2010/main" val="3449380452"/>
+        <p14:creationId xmlns:p14="http://schemas.microsoft.com/office/powerpoint/2010/main" xmlns="" val="3449380452"/>
       </p:ext>
     </p:extLst>
   </p:cSld>
@@ -20831,7 +20809,7 @@
     </p:spTree>
     <p:extLst>
       <p:ext uri="{BB962C8B-B14F-4D97-AF65-F5344CB8AC3E}">
-        <p14:creationId xmlns="" xmlns:p14="http://schemas.microsoft.com/office/powerpoint/2010/main" val="2696938488"/>
+        <p14:creationId xmlns:p14="http://schemas.microsoft.com/office/powerpoint/2010/main" xmlns="" val="2696938488"/>
       </p:ext>
     </p:extLst>
   </p:cSld>
@@ -21237,7 +21215,7 @@
     </p:spTree>
     <p:extLst>
       <p:ext uri="{BB962C8B-B14F-4D97-AF65-F5344CB8AC3E}">
-        <p14:creationId xmlns="" xmlns:p14="http://schemas.microsoft.com/office/powerpoint/2010/main" val="578095862"/>
+        <p14:creationId xmlns:p14="http://schemas.microsoft.com/office/powerpoint/2010/main" xmlns="" val="578095862"/>
       </p:ext>
     </p:extLst>
   </p:cSld>
@@ -21383,7 +21361,7 @@
           <p:nvPr>
             <p:extLst>
               <p:ext uri="{D42A27DB-BD31-4B8C-83A1-F6EECF244321}">
-                <p14:modId xmlns="" xmlns:p14="http://schemas.microsoft.com/office/powerpoint/2010/main" val="3331753744"/>
+                <p14:modId xmlns:p14="http://schemas.microsoft.com/office/powerpoint/2010/main" xmlns="" val="3331753744"/>
               </p:ext>
             </p:extLst>
           </p:nvPr>
@@ -21590,7 +21568,7 @@
     </p:spTree>
     <p:extLst>
       <p:ext uri="{BB962C8B-B14F-4D97-AF65-F5344CB8AC3E}">
-        <p14:creationId xmlns="" xmlns:p14="http://schemas.microsoft.com/office/powerpoint/2010/main" val="471551644"/>
+        <p14:creationId xmlns:p14="http://schemas.microsoft.com/office/powerpoint/2010/main" xmlns="" val="471551644"/>
       </p:ext>
     </p:extLst>
   </p:cSld>
@@ -21784,7 +21762,7 @@
     </p:spTree>
     <p:extLst>
       <p:ext uri="{BB962C8B-B14F-4D97-AF65-F5344CB8AC3E}">
-        <p14:creationId xmlns="" xmlns:p14="http://schemas.microsoft.com/office/powerpoint/2010/main" val="3777868742"/>
+        <p14:creationId xmlns:p14="http://schemas.microsoft.com/office/powerpoint/2010/main" xmlns="" val="3777868742"/>
       </p:ext>
     </p:extLst>
   </p:cSld>
@@ -21835,11 +21813,7 @@
           <a:p>
             <a:r>
               <a:rPr lang="en-US" dirty="0" smtClean="0"/>
-              <a:t>ADC </a:t>
-            </a:r>
-            <a:r>
-              <a:rPr lang="en-US" dirty="0" smtClean="0"/>
-              <a:t>calculation examples </a:t>
+              <a:t>ADC calculation examples </a:t>
             </a:r>
             <a:endParaRPr lang="en-US" dirty="0"/>
           </a:p>
@@ -22000,7 +21974,7 @@
     </p:spTree>
     <p:extLst>
       <p:ext uri="{BB962C8B-B14F-4D97-AF65-F5344CB8AC3E}">
-        <p14:creationId xmlns="" xmlns:p14="http://schemas.microsoft.com/office/powerpoint/2010/main" val="2513686246"/>
+        <p14:creationId xmlns:p14="http://schemas.microsoft.com/office/powerpoint/2010/main" xmlns="" val="2513686246"/>
       </p:ext>
     </p:extLst>
   </p:cSld>
@@ -22076,13 +22050,8 @@
           <a:p>
             <a:r>
               <a:rPr lang="en-US" dirty="0" smtClean="0"/>
-              <a:t>PIC18 has internal on-chip </a:t>
-            </a:r>
-            <a:r>
-              <a:rPr lang="en-US" dirty="0" smtClean="0"/>
-              <a:t>ADC</a:t>
-            </a:r>
-            <a:endParaRPr lang="en-US" dirty="0" smtClean="0"/>
+              <a:t>PIC18 has internal on-chip ADC</a:t>
+            </a:r>
           </a:p>
           <a:p>
             <a:pPr lvl="1"/>
@@ -22211,7 +22180,7 @@
     </p:spTree>
     <p:extLst>
       <p:ext uri="{BB962C8B-B14F-4D97-AF65-F5344CB8AC3E}">
-        <p14:creationId xmlns="" xmlns:p14="http://schemas.microsoft.com/office/powerpoint/2010/main" val="4096532593"/>
+        <p14:creationId xmlns:p14="http://schemas.microsoft.com/office/powerpoint/2010/main" xmlns="" val="4096532593"/>
       </p:ext>
     </p:extLst>
   </p:cSld>
@@ -22436,7 +22405,7 @@
     </p:spTree>
     <p:extLst>
       <p:ext uri="{BB962C8B-B14F-4D97-AF65-F5344CB8AC3E}">
-        <p14:creationId xmlns="" xmlns:p14="http://schemas.microsoft.com/office/powerpoint/2010/main" val="1744305617"/>
+        <p14:creationId xmlns:p14="http://schemas.microsoft.com/office/powerpoint/2010/main" xmlns="" val="1744305617"/>
       </p:ext>
     </p:extLst>
   </p:cSld>
@@ -23040,7 +23009,7 @@
     </p:spTree>
     <p:extLst>
       <p:ext uri="{BB962C8B-B14F-4D97-AF65-F5344CB8AC3E}">
-        <p14:creationId xmlns="" xmlns:p14="http://schemas.microsoft.com/office/powerpoint/2010/main" val="2987622021"/>
+        <p14:creationId xmlns:p14="http://schemas.microsoft.com/office/powerpoint/2010/main" xmlns="" val="2987622021"/>
       </p:ext>
     </p:extLst>
   </p:cSld>
@@ -23543,7 +23512,7 @@
     </p:spTree>
     <p:extLst>
       <p:ext uri="{BB962C8B-B14F-4D97-AF65-F5344CB8AC3E}">
-        <p14:creationId xmlns="" xmlns:p14="http://schemas.microsoft.com/office/powerpoint/2010/main" val="1770805612"/>
+        <p14:creationId xmlns:p14="http://schemas.microsoft.com/office/powerpoint/2010/main" xmlns="" val="1770805612"/>
       </p:ext>
     </p:extLst>
   </p:cSld>
@@ -23820,7 +23789,7 @@
             <p:ph idx="1"/>
             <p:extLst>
               <p:ext uri="{D42A27DB-BD31-4B8C-83A1-F6EECF244321}">
-                <p14:modId xmlns="" xmlns:p14="http://schemas.microsoft.com/office/powerpoint/2010/main" val="3903028857"/>
+                <p14:modId xmlns:p14="http://schemas.microsoft.com/office/powerpoint/2010/main" xmlns="" val="3903028857"/>
               </p:ext>
             </p:extLst>
           </p:nvPr>
@@ -25240,7 +25209,7 @@
     </p:spTree>
     <p:extLst>
       <p:ext uri="{BB962C8B-B14F-4D97-AF65-F5344CB8AC3E}">
-        <p14:creationId xmlns="" xmlns:p14="http://schemas.microsoft.com/office/powerpoint/2010/main" val="1415107628"/>
+        <p14:creationId xmlns:p14="http://schemas.microsoft.com/office/powerpoint/2010/main" xmlns="" val="1415107628"/>
       </p:ext>
     </p:extLst>
   </p:cSld>
@@ -25398,7 +25367,7 @@
     </p:spTree>
     <p:extLst>
       <p:ext uri="{BB962C8B-B14F-4D97-AF65-F5344CB8AC3E}">
-        <p14:creationId xmlns="" xmlns:p14="http://schemas.microsoft.com/office/powerpoint/2010/main" val="3665629998"/>
+        <p14:creationId xmlns:p14="http://schemas.microsoft.com/office/powerpoint/2010/main" xmlns="" val="3665629998"/>
       </p:ext>
     </p:extLst>
   </p:cSld>
@@ -25690,7 +25659,7 @@
     </p:spTree>
     <p:extLst>
       <p:ext uri="{BB962C8B-B14F-4D97-AF65-F5344CB8AC3E}">
-        <p14:creationId xmlns="" xmlns:p14="http://schemas.microsoft.com/office/powerpoint/2010/main" val="571336925"/>
+        <p14:creationId xmlns:p14="http://schemas.microsoft.com/office/powerpoint/2010/main" xmlns="" val="571336925"/>
       </p:ext>
     </p:extLst>
   </p:cSld>
@@ -25913,7 +25882,7 @@
     </p:spTree>
     <p:extLst>
       <p:ext uri="{BB962C8B-B14F-4D97-AF65-F5344CB8AC3E}">
-        <p14:creationId xmlns="" xmlns:p14="http://schemas.microsoft.com/office/powerpoint/2010/main" val="3776683266"/>
+        <p14:creationId xmlns:p14="http://schemas.microsoft.com/office/powerpoint/2010/main" xmlns="" val="3776683266"/>
       </p:ext>
     </p:extLst>
   </p:cSld>
@@ -26590,7 +26559,7 @@
     </p:spTree>
     <p:extLst>
       <p:ext uri="{BB962C8B-B14F-4D97-AF65-F5344CB8AC3E}">
-        <p14:creationId xmlns="" xmlns:p14="http://schemas.microsoft.com/office/powerpoint/2010/main" val="1968262321"/>
+        <p14:creationId xmlns:p14="http://schemas.microsoft.com/office/powerpoint/2010/main" xmlns="" val="1968262321"/>
       </p:ext>
     </p:extLst>
   </p:cSld>
@@ -26713,7 +26682,7 @@
     </p:spTree>
     <p:extLst>
       <p:ext uri="{BB962C8B-B14F-4D97-AF65-F5344CB8AC3E}">
-        <p14:creationId xmlns="" xmlns:p14="http://schemas.microsoft.com/office/powerpoint/2010/main" val="3776697499"/>
+        <p14:creationId xmlns:p14="http://schemas.microsoft.com/office/powerpoint/2010/main" xmlns="" val="3776697499"/>
       </p:ext>
     </p:extLst>
   </p:cSld>
@@ -26861,7 +26830,7 @@
     </p:spTree>
     <p:extLst>
       <p:ext uri="{BB962C8B-B14F-4D97-AF65-F5344CB8AC3E}">
-        <p14:creationId xmlns="" xmlns:p14="http://schemas.microsoft.com/office/powerpoint/2010/main" val="336050946"/>
+        <p14:creationId xmlns:p14="http://schemas.microsoft.com/office/powerpoint/2010/main" xmlns="" val="336050946"/>
       </p:ext>
     </p:extLst>
   </p:cSld>
@@ -27009,7 +26978,7 @@
     </p:spTree>
     <p:extLst>
       <p:ext uri="{BB962C8B-B14F-4D97-AF65-F5344CB8AC3E}">
-        <p14:creationId xmlns="" xmlns:p14="http://schemas.microsoft.com/office/powerpoint/2010/main" val="1554220253"/>
+        <p14:creationId xmlns:p14="http://schemas.microsoft.com/office/powerpoint/2010/main" xmlns="" val="1554220253"/>
       </p:ext>
     </p:extLst>
   </p:cSld>
@@ -27139,7 +27108,7 @@
     </p:spTree>
     <p:extLst>
       <p:ext uri="{BB962C8B-B14F-4D97-AF65-F5344CB8AC3E}">
-        <p14:creationId xmlns="" xmlns:p14="http://schemas.microsoft.com/office/powerpoint/2010/main" val="3690726244"/>
+        <p14:creationId xmlns:p14="http://schemas.microsoft.com/office/powerpoint/2010/main" xmlns="" val="3690726244"/>
       </p:ext>
     </p:extLst>
   </p:cSld>
@@ -27491,7 +27460,7 @@
     </p:spTree>
     <p:extLst>
       <p:ext uri="{BB962C8B-B14F-4D97-AF65-F5344CB8AC3E}">
-        <p14:creationId xmlns="" xmlns:p14="http://schemas.microsoft.com/office/powerpoint/2010/main" val="1769887430"/>
+        <p14:creationId xmlns:p14="http://schemas.microsoft.com/office/powerpoint/2010/main" xmlns="" val="1769887430"/>
       </p:ext>
     </p:extLst>
   </p:cSld>
@@ -27653,7 +27622,7 @@
     </p:spTree>
     <p:extLst>
       <p:ext uri="{BB962C8B-B14F-4D97-AF65-F5344CB8AC3E}">
-        <p14:creationId xmlns="" xmlns:p14="http://schemas.microsoft.com/office/powerpoint/2010/main" val="2847287283"/>
+        <p14:creationId xmlns:p14="http://schemas.microsoft.com/office/powerpoint/2010/main" xmlns="" val="2847287283"/>
       </p:ext>
     </p:extLst>
   </p:cSld>
@@ -27815,7 +27784,7 @@
     </p:spTree>
     <p:extLst>
       <p:ext uri="{BB962C8B-B14F-4D97-AF65-F5344CB8AC3E}">
-        <p14:creationId xmlns="" xmlns:p14="http://schemas.microsoft.com/office/powerpoint/2010/main" val="2489726984"/>
+        <p14:creationId xmlns:p14="http://schemas.microsoft.com/office/powerpoint/2010/main" xmlns="" val="2489726984"/>
       </p:ext>
     </p:extLst>
   </p:cSld>
@@ -28206,7 +28175,7 @@
     </p:spTree>
     <p:extLst>
       <p:ext uri="{BB962C8B-B14F-4D97-AF65-F5344CB8AC3E}">
-        <p14:creationId xmlns="" xmlns:p14="http://schemas.microsoft.com/office/powerpoint/2010/main" val="1492518072"/>
+        <p14:creationId xmlns:p14="http://schemas.microsoft.com/office/powerpoint/2010/main" xmlns="" val="1492518072"/>
       </p:ext>
     </p:extLst>
   </p:cSld>
@@ -28517,7 +28486,7 @@
     </p:spTree>
     <p:extLst>
       <p:ext uri="{BB962C8B-B14F-4D97-AF65-F5344CB8AC3E}">
-        <p14:creationId xmlns="" xmlns:p14="http://schemas.microsoft.com/office/powerpoint/2010/main" val="1454803106"/>
+        <p14:creationId xmlns:p14="http://schemas.microsoft.com/office/powerpoint/2010/main" xmlns="" val="1454803106"/>
       </p:ext>
     </p:extLst>
   </p:cSld>
@@ -28654,7 +28623,7 @@
     </p:spTree>
     <p:extLst>
       <p:ext uri="{BB962C8B-B14F-4D97-AF65-F5344CB8AC3E}">
-        <p14:creationId xmlns="" xmlns:p14="http://schemas.microsoft.com/office/powerpoint/2010/main" val="106633874"/>
+        <p14:creationId xmlns:p14="http://schemas.microsoft.com/office/powerpoint/2010/main" xmlns="" val="106633874"/>
       </p:ext>
     </p:extLst>
   </p:cSld>
@@ -28959,7 +28928,7 @@
     </p:spTree>
     <p:extLst>
       <p:ext uri="{BB962C8B-B14F-4D97-AF65-F5344CB8AC3E}">
-        <p14:creationId xmlns="" xmlns:p14="http://schemas.microsoft.com/office/powerpoint/2010/main" val="1694370536"/>
+        <p14:creationId xmlns:p14="http://schemas.microsoft.com/office/powerpoint/2010/main" xmlns="" val="1694370536"/>
       </p:ext>
     </p:extLst>
   </p:cSld>
@@ -29116,7 +29085,7 @@
     </p:spTree>
     <p:extLst>
       <p:ext uri="{BB962C8B-B14F-4D97-AF65-F5344CB8AC3E}">
-        <p14:creationId xmlns="" xmlns:p14="http://schemas.microsoft.com/office/powerpoint/2010/main" val="94778730"/>
+        <p14:creationId xmlns:p14="http://schemas.microsoft.com/office/powerpoint/2010/main" xmlns="" val="94778730"/>
       </p:ext>
     </p:extLst>
   </p:cSld>
@@ -29396,7 +29365,7 @@
     </p:spTree>
     <p:extLst>
       <p:ext uri="{BB962C8B-B14F-4D97-AF65-F5344CB8AC3E}">
-        <p14:creationId xmlns="" xmlns:p14="http://schemas.microsoft.com/office/powerpoint/2010/main" val="689868789"/>
+        <p14:creationId xmlns:p14="http://schemas.microsoft.com/office/powerpoint/2010/main" xmlns="" val="689868789"/>
       </p:ext>
     </p:extLst>
   </p:cSld>
@@ -29632,7 +29601,7 @@
     </p:spTree>
     <p:extLst>
       <p:ext uri="{BB962C8B-B14F-4D97-AF65-F5344CB8AC3E}">
-        <p14:creationId xmlns="" xmlns:p14="http://schemas.microsoft.com/office/powerpoint/2010/main" val="2688836249"/>
+        <p14:creationId xmlns:p14="http://schemas.microsoft.com/office/powerpoint/2010/main" xmlns="" val="2688836249"/>
       </p:ext>
     </p:extLst>
   </p:cSld>

</xml_diff>